<commit_message>
readme and plotter v1 updated.
</commit_message>
<xml_diff>
--- a/plotter/plotter.pptx
+++ b/plotter/plotter.pptx
@@ -3304,6 +3304,68 @@
       </p:grpSpPr>
       <p:sp>
         <p:nvSpPr>
+          <p:cNvPr id="84" name="圓角矩形 6">
+            <a:extLst>
+              <a:ext uri="{FF2B5EF4-FFF2-40B4-BE49-F238E27FC236}">
+                <a16:creationId xmlns:a16="http://schemas.microsoft.com/office/drawing/2014/main" id="{355FB84D-1D92-54C0-7D3D-36331A35B47E}"/>
+              </a:ext>
+            </a:extLst>
+          </p:cNvPr>
+          <p:cNvSpPr/>
+          <p:nvPr/>
+        </p:nvSpPr>
+        <p:spPr>
+          <a:xfrm>
+            <a:off x="1392195" y="527169"/>
+            <a:ext cx="7457681" cy="2656132"/>
+          </a:xfrm>
+          <a:prstGeom prst="roundRect">
+            <a:avLst/>
+          </a:prstGeom>
+          <a:solidFill>
+            <a:srgbClr val="FFC000">
+              <a:alpha val="14908"/>
+            </a:srgbClr>
+          </a:solidFill>
+          <a:ln w="28575">
+            <a:solidFill>
+              <a:srgbClr val="FFC000"/>
+            </a:solidFill>
+          </a:ln>
+        </p:spPr>
+        <p:style>
+          <a:lnRef idx="2">
+            <a:schemeClr val="accent1">
+              <a:shade val="50000"/>
+            </a:schemeClr>
+          </a:lnRef>
+          <a:fillRef idx="1">
+            <a:schemeClr val="accent1"/>
+          </a:fillRef>
+          <a:effectRef idx="0">
+            <a:schemeClr val="accent1"/>
+          </a:effectRef>
+          <a:fontRef idx="minor">
+            <a:schemeClr val="lt1"/>
+          </a:fontRef>
+        </p:style>
+        <p:txBody>
+          <a:bodyPr rtlCol="0" anchor="ctr"/>
+          <a:lstStyle/>
+          <a:p>
+            <a:pPr algn="ctr"/>
+            <a:endParaRPr lang="zh-TW" altLang="en-US" sz="1400" b="1" dirty="0">
+              <a:solidFill>
+                <a:schemeClr val="tx1"/>
+              </a:solidFill>
+              <a:latin typeface="Arial" panose="020B0604020202020204" pitchFamily="34" charset="0"/>
+              <a:cs typeface="Arial" panose="020B0604020202020204" pitchFamily="34" charset="0"/>
+            </a:endParaRPr>
+          </a:p>
+        </p:txBody>
+      </p:sp>
+      <p:sp>
+        <p:nvSpPr>
           <p:cNvPr id="82" name="圓角矩形 6">
             <a:extLst>
               <a:ext uri="{FF2B5EF4-FFF2-40B4-BE49-F238E27FC236}">
@@ -3316,7 +3378,7 @@
         </p:nvSpPr>
         <p:spPr>
           <a:xfrm>
-            <a:off x="1139022" y="393875"/>
+            <a:off x="1245428" y="393876"/>
             <a:ext cx="8009801" cy="5535827"/>
           </a:xfrm>
           <a:prstGeom prst="roundRect">
@@ -3789,7 +3851,7 @@
                 <a:latin typeface="Arial" panose="020B0604020202020204" pitchFamily="34" charset="0"/>
                 <a:cs typeface="Arial" panose="020B0604020202020204" pitchFamily="34" charset="0"/>
               </a:rPr>
-              <a:t>game play state (state = 2)</a:t>
+              <a:t>File reader state (state = 2)</a:t>
             </a:r>
             <a:endParaRPr lang="zh-TW" altLang="en-US" sz="1600" b="1" dirty="0">
               <a:latin typeface="Arial" panose="020B0604020202020204" pitchFamily="34" charset="0"/>
@@ -4674,82 +4736,20 @@
       </p:sp>
       <p:sp>
         <p:nvSpPr>
-          <p:cNvPr id="84" name="圓角矩形 6">
-            <a:extLst>
-              <a:ext uri="{FF2B5EF4-FFF2-40B4-BE49-F238E27FC236}">
-                <a16:creationId xmlns:a16="http://schemas.microsoft.com/office/drawing/2014/main" id="{355FB84D-1D92-54C0-7D3D-36331A35B47E}"/>
-              </a:ext>
-            </a:extLst>
-          </p:cNvPr>
-          <p:cNvSpPr/>
+          <p:cNvPr id="86" name="文字方塊 110">
+            <a:extLst>
+              <a:ext uri="{FF2B5EF4-FFF2-40B4-BE49-F238E27FC236}">
+                <a16:creationId xmlns:a16="http://schemas.microsoft.com/office/drawing/2014/main" id="{D7994D52-3573-6556-2CD9-7D4646925C7B}"/>
+              </a:ext>
+            </a:extLst>
+          </p:cNvPr>
+          <p:cNvSpPr txBox="1"/>
           <p:nvPr/>
         </p:nvSpPr>
         <p:spPr>
           <a:xfrm>
-            <a:off x="1392195" y="527169"/>
-            <a:ext cx="7457681" cy="2656132"/>
-          </a:xfrm>
-          <a:prstGeom prst="roundRect">
-            <a:avLst/>
-          </a:prstGeom>
-          <a:solidFill>
-            <a:srgbClr val="FFC000">
-              <a:alpha val="14908"/>
-            </a:srgbClr>
-          </a:solidFill>
-          <a:ln w="28575">
-            <a:solidFill>
-              <a:srgbClr val="FFC000"/>
-            </a:solidFill>
-          </a:ln>
-        </p:spPr>
-        <p:style>
-          <a:lnRef idx="2">
-            <a:schemeClr val="accent1">
-              <a:shade val="50000"/>
-            </a:schemeClr>
-          </a:lnRef>
-          <a:fillRef idx="1">
-            <a:schemeClr val="accent1"/>
-          </a:fillRef>
-          <a:effectRef idx="0">
-            <a:schemeClr val="accent1"/>
-          </a:effectRef>
-          <a:fontRef idx="minor">
-            <a:schemeClr val="lt1"/>
-          </a:fontRef>
-        </p:style>
-        <p:txBody>
-          <a:bodyPr rtlCol="0" anchor="ctr"/>
-          <a:lstStyle/>
-          <a:p>
-            <a:pPr algn="ctr"/>
-            <a:endParaRPr lang="zh-TW" altLang="en-US" sz="1400" b="1" dirty="0">
-              <a:solidFill>
-                <a:schemeClr val="tx1"/>
-              </a:solidFill>
-              <a:latin typeface="Arial" panose="020B0604020202020204" pitchFamily="34" charset="0"/>
-              <a:cs typeface="Arial" panose="020B0604020202020204" pitchFamily="34" charset="0"/>
-            </a:endParaRPr>
-          </a:p>
-        </p:txBody>
-      </p:sp>
-      <p:sp>
-        <p:nvSpPr>
-          <p:cNvPr id="86" name="文字方塊 110">
-            <a:extLst>
-              <a:ext uri="{FF2B5EF4-FFF2-40B4-BE49-F238E27FC236}">
-                <a16:creationId xmlns:a16="http://schemas.microsoft.com/office/drawing/2014/main" id="{D7994D52-3573-6556-2CD9-7D4646925C7B}"/>
-              </a:ext>
-            </a:extLst>
-          </p:cNvPr>
-          <p:cNvSpPr txBox="1"/>
-          <p:nvPr/>
-        </p:nvSpPr>
-        <p:spPr>
-          <a:xfrm>
-            <a:off x="4402285" y="2735310"/>
-            <a:ext cx="1926569" cy="400110"/>
+            <a:off x="4176391" y="2735310"/>
+            <a:ext cx="2748157" cy="400110"/>
           </a:xfrm>
           <a:prstGeom prst="rect">
             <a:avLst/>
@@ -4771,124 +4771,12 @@
                 <a:latin typeface="Arial" panose="020B0604020202020204" pitchFamily="34" charset="0"/>
                 <a:cs typeface="Arial" panose="020B0604020202020204" pitchFamily="34" charset="0"/>
               </a:rPr>
-              <a:t>Essential</a:t>
+              <a:t>Essential(11/23)</a:t>
             </a:r>
             <a:endParaRPr lang="zh-TW" altLang="en-US" sz="2000" b="1" dirty="0">
               <a:solidFill>
                 <a:schemeClr val="accent2"/>
               </a:solidFill>
-              <a:latin typeface="Arial" panose="020B0604020202020204" pitchFamily="34" charset="0"/>
-              <a:cs typeface="Arial" panose="020B0604020202020204" pitchFamily="34" charset="0"/>
-            </a:endParaRPr>
-          </a:p>
-        </p:txBody>
-      </p:sp>
-      <p:sp>
-        <p:nvSpPr>
-          <p:cNvPr id="87" name="圓角矩形 8">
-            <a:extLst>
-              <a:ext uri="{FF2B5EF4-FFF2-40B4-BE49-F238E27FC236}">
-                <a16:creationId xmlns:a16="http://schemas.microsoft.com/office/drawing/2014/main" id="{C1C2D49B-A339-99C2-311F-A0BEF72F1DEA}"/>
-              </a:ext>
-            </a:extLst>
-          </p:cNvPr>
-          <p:cNvSpPr/>
-          <p:nvPr/>
-        </p:nvSpPr>
-        <p:spPr>
-          <a:xfrm flipH="1">
-            <a:off x="6041176" y="3753022"/>
-            <a:ext cx="1640745" cy="1288095"/>
-          </a:xfrm>
-          <a:prstGeom prst="roundRect">
-            <a:avLst/>
-          </a:prstGeom>
-          <a:solidFill>
-            <a:schemeClr val="bg2">
-              <a:lumMod val="10000"/>
-            </a:schemeClr>
-          </a:solidFill>
-          <a:ln>
-            <a:solidFill>
-              <a:schemeClr val="tx1">
-                <a:lumMod val="85000"/>
-                <a:lumOff val="15000"/>
-              </a:schemeClr>
-            </a:solidFill>
-          </a:ln>
-        </p:spPr>
-        <p:style>
-          <a:lnRef idx="2">
-            <a:schemeClr val="accent1">
-              <a:shade val="50000"/>
-            </a:schemeClr>
-          </a:lnRef>
-          <a:fillRef idx="1">
-            <a:schemeClr val="accent1"/>
-          </a:fillRef>
-          <a:effectRef idx="0">
-            <a:schemeClr val="accent1"/>
-          </a:effectRef>
-          <a:fontRef idx="minor">
-            <a:schemeClr val="lt1"/>
-          </a:fontRef>
-        </p:style>
-        <p:txBody>
-          <a:bodyPr rtlCol="0" anchor="ctr"/>
-          <a:lstStyle/>
-          <a:p>
-            <a:pPr algn="ctr"/>
-            <a:r>
-              <a:rPr lang="en-US" altLang="zh-TW" sz="1600" b="1" dirty="0">
-                <a:latin typeface="Arial" panose="020B0604020202020204" pitchFamily="34" charset="0"/>
-                <a:cs typeface="Arial" panose="020B0604020202020204" pitchFamily="34" charset="0"/>
-              </a:rPr>
-              <a:t>I/O status:</a:t>
-            </a:r>
-            <a:endParaRPr lang="zh-TW" altLang="en-US" sz="1600" b="1" dirty="0">
-              <a:latin typeface="Arial" panose="020B0604020202020204" pitchFamily="34" charset="0"/>
-              <a:cs typeface="Arial" panose="020B0604020202020204" pitchFamily="34" charset="0"/>
-            </a:endParaRPr>
-          </a:p>
-        </p:txBody>
-      </p:sp>
-      <p:sp>
-        <p:nvSpPr>
-          <p:cNvPr id="88" name="文字方塊 110">
-            <a:extLst>
-              <a:ext uri="{FF2B5EF4-FFF2-40B4-BE49-F238E27FC236}">
-                <a16:creationId xmlns:a16="http://schemas.microsoft.com/office/drawing/2014/main" id="{2FDB163B-4954-7CC4-F6FE-C55231398FE5}"/>
-              </a:ext>
-            </a:extLst>
-          </p:cNvPr>
-          <p:cNvSpPr txBox="1"/>
-          <p:nvPr/>
-        </p:nvSpPr>
-        <p:spPr>
-          <a:xfrm>
-            <a:off x="6011731" y="5081551"/>
-            <a:ext cx="1640745" cy="584775"/>
-          </a:xfrm>
-          <a:prstGeom prst="rect">
-            <a:avLst/>
-          </a:prstGeom>
-          <a:noFill/>
-        </p:spPr>
-        <p:txBody>
-          <a:bodyPr wrap="square" rtlCol="0">
-            <a:spAutoFit/>
-          </a:bodyPr>
-          <a:lstStyle/>
-          <a:p>
-            <a:pPr algn="ctr"/>
-            <a:r>
-              <a:rPr lang="en-US" altLang="zh-TW" sz="1600" b="1" dirty="0">
-                <a:latin typeface="Arial" panose="020B0604020202020204" pitchFamily="34" charset="0"/>
-                <a:cs typeface="Arial" panose="020B0604020202020204" pitchFamily="34" charset="0"/>
-              </a:rPr>
-              <a:t>File reader state (state = 3)</a:t>
-            </a:r>
-            <a:endParaRPr lang="zh-TW" altLang="en-US" sz="1600" b="1" dirty="0">
               <a:latin typeface="Arial" panose="020B0604020202020204" pitchFamily="34" charset="0"/>
               <a:cs typeface="Arial" panose="020B0604020202020204" pitchFamily="34" charset="0"/>
             </a:endParaRPr>

</xml_diff>